<commit_message>
modify image for passay #1604
</commit_message>
<xml_diff>
--- a/source/Security/images_SecureLoginDemo/materialSecureLoginDemo.pptx
+++ b/source/Security/images_SecureLoginDemo/materialSecureLoginDemo.pptx
@@ -9629,7 +9629,7 @@
         </p:nvSpPr>
         <p:spPr>
           <a:xfrm>
-            <a:off x="641528" y="1753697"/>
+            <a:off x="677488" y="1114426"/>
             <a:ext cx="2130272" cy="2006970"/>
           </a:xfrm>
           <a:prstGeom prst="rect">
@@ -9667,8 +9667,8 @@
         </p:nvSpPr>
         <p:spPr>
           <a:xfrm>
-            <a:off x="611560" y="1772816"/>
-            <a:ext cx="2232248" cy="369332"/>
+            <a:off x="719528" y="1133545"/>
+            <a:ext cx="2160240" cy="369332"/>
           </a:xfrm>
           <a:prstGeom prst="rect">
             <a:avLst/>
@@ -9683,7 +9683,7 @@
           <a:p>
             <a:r>
               <a:rPr kumimoji="1" lang="en-US" altLang="ja-JP" smtClean="0"/>
-              <a:t>(1) </a:t>
+              <a:t> </a:t>
             </a:r>
             <a:r>
               <a:rPr kumimoji="1" lang="en-US" altLang="ja-JP" err="1" smtClean="0"/>
@@ -9701,7 +9701,7 @@
         </p:nvSpPr>
         <p:spPr>
           <a:xfrm>
-            <a:off x="5364088" y="1228630"/>
+            <a:off x="5508104" y="982994"/>
             <a:ext cx="1944216" cy="3024336"/>
           </a:xfrm>
           <a:prstGeom prst="rect">
@@ -9739,8 +9739,8 @@
         </p:nvSpPr>
         <p:spPr>
           <a:xfrm>
-            <a:off x="5436096" y="1228630"/>
-            <a:ext cx="1872208" cy="369332"/>
+            <a:off x="5724128" y="982994"/>
+            <a:ext cx="1656184" cy="369332"/>
           </a:xfrm>
           <a:prstGeom prst="rect">
             <a:avLst/>
@@ -9755,52 +9755,12 @@
           <a:p>
             <a:r>
               <a:rPr kumimoji="1" lang="en-US" altLang="ja-JP" smtClean="0"/>
-              <a:t>(2) </a:t>
-            </a:r>
-            <a:r>
-              <a:rPr kumimoji="1" lang="en-US" altLang="ja-JP" err="1" smtClean="0"/>
               <a:t>PasswordData</a:t>
             </a:r>
             <a:endParaRPr kumimoji="1" lang="ja-JP" altLang="en-US"/>
           </a:p>
         </p:txBody>
       </p:sp>
-      <p:cxnSp>
-        <p:nvCxnSpPr>
-          <p:cNvPr id="21" name="直線矢印コネクタ 20"/>
-          <p:cNvCxnSpPr>
-            <a:stCxn id="4" idx="3"/>
-            <a:endCxn id="11" idx="1"/>
-          </p:cNvCxnSpPr>
-          <p:nvPr/>
-        </p:nvCxnSpPr>
-        <p:spPr>
-          <a:xfrm flipV="1">
-            <a:off x="2771800" y="2740798"/>
-            <a:ext cx="2592288" cy="16384"/>
-          </a:xfrm>
-          <a:prstGeom prst="straightConnector1">
-            <a:avLst/>
-          </a:prstGeom>
-          <a:ln>
-            <a:tailEnd type="arrow"/>
-          </a:ln>
-        </p:spPr>
-        <p:style>
-          <a:lnRef idx="2">
-            <a:schemeClr val="dk1"/>
-          </a:lnRef>
-          <a:fillRef idx="0">
-            <a:schemeClr val="dk1"/>
-          </a:fillRef>
-          <a:effectRef idx="1">
-            <a:schemeClr val="dk1"/>
-          </a:effectRef>
-          <a:fontRef idx="minor">
-            <a:schemeClr val="tx1"/>
-          </a:fontRef>
-        </p:style>
-      </p:cxnSp>
       <p:sp>
         <p:nvSpPr>
           <p:cNvPr id="23" name="テキスト ボックス 22"/>
@@ -9809,7 +9769,7 @@
         </p:nvSpPr>
         <p:spPr>
           <a:xfrm>
-            <a:off x="3491880" y="4365104"/>
+            <a:off x="5724128" y="4869160"/>
             <a:ext cx="1512168" cy="369332"/>
           </a:xfrm>
           <a:prstGeom prst="rect">
@@ -9836,12 +9796,9 @@
           </a:bodyPr>
           <a:lstStyle/>
           <a:p>
+            <a:pPr algn="ctr"/>
             <a:r>
               <a:rPr kumimoji="1" lang="en-US" altLang="ja-JP" smtClean="0"/>
-              <a:t>(4) </a:t>
-            </a:r>
-            <a:r>
-              <a:rPr kumimoji="1" lang="en-US" altLang="ja-JP" err="1" smtClean="0"/>
               <a:t>RuleResult</a:t>
             </a:r>
             <a:endParaRPr kumimoji="1" lang="ja-JP" altLang="en-US"/>
@@ -9856,7 +9813,7 @@
         </p:nvSpPr>
         <p:spPr>
           <a:xfrm>
-            <a:off x="5580112" y="1658811"/>
+            <a:off x="5724128" y="1413175"/>
             <a:ext cx="1440160" cy="361907"/>
           </a:xfrm>
           <a:prstGeom prst="roundRect">
@@ -9906,7 +9863,7 @@
         </p:nvSpPr>
         <p:spPr>
           <a:xfrm>
-            <a:off x="5580112" y="2164734"/>
+            <a:off x="5724128" y="1919098"/>
             <a:ext cx="1440160" cy="361907"/>
           </a:xfrm>
           <a:prstGeom prst="roundRect">
@@ -9956,7 +9913,7 @@
         </p:nvSpPr>
         <p:spPr>
           <a:xfrm>
-            <a:off x="5580112" y="2646497"/>
+            <a:off x="5724128" y="2400861"/>
             <a:ext cx="1440160" cy="1534461"/>
           </a:xfrm>
           <a:prstGeom prst="roundRect">
@@ -10002,7 +9959,7 @@
         </p:nvSpPr>
         <p:spPr>
           <a:xfrm>
-            <a:off x="5724128" y="2801684"/>
+            <a:off x="5868144" y="2556048"/>
             <a:ext cx="1152128" cy="371162"/>
           </a:xfrm>
           <a:prstGeom prst="rect">
@@ -10044,7 +10001,7 @@
         </p:nvSpPr>
         <p:spPr>
           <a:xfrm>
-            <a:off x="5724128" y="3244854"/>
+            <a:off x="5868144" y="2999218"/>
             <a:ext cx="1152128" cy="371162"/>
           </a:xfrm>
           <a:prstGeom prst="rect">
@@ -10086,7 +10043,7 @@
         </p:nvSpPr>
         <p:spPr>
           <a:xfrm>
-            <a:off x="5724128" y="3665780"/>
+            <a:off x="5868144" y="3420144"/>
             <a:ext cx="1152128" cy="371162"/>
           </a:xfrm>
           <a:prstGeom prst="rect">
@@ -10128,7 +10085,7 @@
         </p:nvSpPr>
         <p:spPr>
           <a:xfrm>
-            <a:off x="827584" y="2276872"/>
+            <a:off x="863544" y="1637601"/>
             <a:ext cx="1728192" cy="1368152"/>
           </a:xfrm>
           <a:prstGeom prst="roundRect">
@@ -10174,7 +10131,7 @@
         </p:nvSpPr>
         <p:spPr>
           <a:xfrm>
-            <a:off x="1051992" y="3212976"/>
+            <a:off x="1087952" y="2573705"/>
             <a:ext cx="1287760" cy="288032"/>
           </a:xfrm>
           <a:prstGeom prst="rect">
@@ -10216,7 +10173,7 @@
         </p:nvSpPr>
         <p:spPr>
           <a:xfrm>
-            <a:off x="1047541" y="2852936"/>
+            <a:off x="1083501" y="2213665"/>
             <a:ext cx="1287760" cy="288032"/>
           </a:xfrm>
           <a:prstGeom prst="rect">
@@ -10258,7 +10215,7 @@
         </p:nvSpPr>
         <p:spPr>
           <a:xfrm>
-            <a:off x="1047541" y="2420888"/>
+            <a:off x="1083501" y="1781617"/>
             <a:ext cx="1287760" cy="324969"/>
           </a:xfrm>
           <a:prstGeom prst="rect">
@@ -10292,87 +10249,16 @@
           </a:p>
         </p:txBody>
       </p:sp>
-      <p:cxnSp>
-        <p:nvCxnSpPr>
-          <p:cNvPr id="33" name="直線矢印コネクタ 32"/>
-          <p:cNvCxnSpPr>
-            <a:endCxn id="23" idx="0"/>
-          </p:cNvCxnSpPr>
-          <p:nvPr/>
-        </p:nvCxnSpPr>
-        <p:spPr>
-          <a:xfrm flipH="1">
-            <a:off x="4247964" y="2740798"/>
-            <a:ext cx="7492" cy="1624306"/>
-          </a:xfrm>
-          <a:prstGeom prst="straightConnector1">
-            <a:avLst/>
-          </a:prstGeom>
-          <a:ln>
-            <a:tailEnd type="arrow"/>
-          </a:ln>
-        </p:spPr>
-        <p:style>
-          <a:lnRef idx="2">
-            <a:schemeClr val="dk1"/>
-          </a:lnRef>
-          <a:fillRef idx="0">
-            <a:schemeClr val="dk1"/>
-          </a:fillRef>
-          <a:effectRef idx="1">
-            <a:schemeClr val="dk1"/>
-          </a:effectRef>
-          <a:fontRef idx="minor">
-            <a:schemeClr val="tx1"/>
-          </a:fontRef>
-        </p:style>
-      </p:cxnSp>
-      <p:cxnSp>
-        <p:nvCxnSpPr>
-          <p:cNvPr id="36" name="カギ線コネクタ 35"/>
-          <p:cNvCxnSpPr>
-            <a:stCxn id="4" idx="2"/>
-            <a:endCxn id="23" idx="1"/>
-          </p:cNvCxnSpPr>
-          <p:nvPr/>
-        </p:nvCxnSpPr>
-        <p:spPr>
-          <a:xfrm rot="16200000" flipH="1">
-            <a:off x="2204721" y="3262610"/>
-            <a:ext cx="789103" cy="1785216"/>
-          </a:xfrm>
-          <a:prstGeom prst="bentConnector2">
-            <a:avLst/>
-          </a:prstGeom>
-          <a:ln>
-            <a:tailEnd type="arrow"/>
-          </a:ln>
-        </p:spPr>
-        <p:style>
-          <a:lnRef idx="2">
-            <a:schemeClr val="dk1"/>
-          </a:lnRef>
-          <a:fillRef idx="0">
-            <a:schemeClr val="dk1"/>
-          </a:fillRef>
-          <a:effectRef idx="1">
-            <a:schemeClr val="dk1"/>
-          </a:effectRef>
-          <a:fontRef idx="minor">
-            <a:schemeClr val="tx1"/>
-          </a:fontRef>
-        </p:style>
-      </p:cxnSp>
-      <p:sp>
-        <p:nvSpPr>
-          <p:cNvPr id="42" name="テキスト ボックス 41"/>
+      <p:sp>
+        <p:nvSpPr>
+          <p:cNvPr id="6" name="テキスト ボックス 5"/>
           <p:cNvSpPr txBox="1"/>
           <p:nvPr/>
         </p:nvSpPr>
         <p:spPr>
           <a:xfrm>
-            <a:off x="2822788" y="2341975"/>
-            <a:ext cx="1656184" cy="369332"/>
+            <a:off x="257149" y="692696"/>
+            <a:ext cx="3084998" cy="369332"/>
           </a:xfrm>
           <a:prstGeom prst="rect">
             <a:avLst/>
@@ -10387,22 +10273,22 @@
           <a:p>
             <a:r>
               <a:rPr kumimoji="1" lang="en-US" altLang="ja-JP" smtClean="0"/>
-              <a:t>(3) validate</a:t>
-            </a:r>
-            <a:endParaRPr kumimoji="1" lang="ja-JP" altLang="en-US"/>
-          </a:p>
-        </p:txBody>
-      </p:sp>
-      <p:sp>
-        <p:nvSpPr>
-          <p:cNvPr id="44" name="テキスト ボックス 43"/>
+              <a:t>(1) prepare PasswordValidator</a:t>
+            </a:r>
+            <a:endParaRPr kumimoji="1" lang="ja-JP" altLang="en-US"/>
+          </a:p>
+        </p:txBody>
+      </p:sp>
+      <p:sp>
+        <p:nvSpPr>
+          <p:cNvPr id="28" name="テキスト ボックス 27"/>
           <p:cNvSpPr txBox="1"/>
           <p:nvPr/>
         </p:nvSpPr>
         <p:spPr>
           <a:xfrm>
-            <a:off x="1547664" y="4581128"/>
-            <a:ext cx="1785216" cy="369332"/>
+            <a:off x="5256076" y="548680"/>
+            <a:ext cx="2376264" cy="369332"/>
           </a:xfrm>
           <a:prstGeom prst="rect">
             <a:avLst/>
@@ -10417,11 +10303,255 @@
           <a:p>
             <a:r>
               <a:rPr kumimoji="1" lang="en-US" altLang="ja-JP" smtClean="0"/>
-              <a:t>(5) </a:t>
-            </a:r>
-            <a:r>
-              <a:rPr kumimoji="1" lang="en-US" altLang="ja-JP" err="1" smtClean="0"/>
-              <a:t>getMessages</a:t>
+              <a:t>(2) make PasswordData</a:t>
+            </a:r>
+            <a:endParaRPr kumimoji="1" lang="ja-JP" altLang="en-US"/>
+          </a:p>
+        </p:txBody>
+      </p:sp>
+      <p:sp>
+        <p:nvSpPr>
+          <p:cNvPr id="7" name="右矢印 6"/>
+          <p:cNvSpPr/>
+          <p:nvPr/>
+        </p:nvSpPr>
+        <p:spPr>
+          <a:xfrm>
+            <a:off x="3203848" y="1944101"/>
+            <a:ext cx="1944216" cy="269564"/>
+          </a:xfrm>
+          <a:prstGeom prst="rightArrow">
+            <a:avLst/>
+          </a:prstGeom>
+        </p:spPr>
+        <p:style>
+          <a:lnRef idx="2">
+            <a:schemeClr val="accent1">
+              <a:shade val="50000"/>
+            </a:schemeClr>
+          </a:lnRef>
+          <a:fillRef idx="1">
+            <a:schemeClr val="accent1"/>
+          </a:fillRef>
+          <a:effectRef idx="0">
+            <a:schemeClr val="accent1"/>
+          </a:effectRef>
+          <a:fontRef idx="minor">
+            <a:schemeClr val="lt1"/>
+          </a:fontRef>
+        </p:style>
+        <p:txBody>
+          <a:bodyPr rtlCol="0" anchor="ctr"/>
+          <a:lstStyle/>
+          <a:p>
+            <a:pPr algn="ctr"/>
+            <a:endParaRPr kumimoji="1" lang="ja-JP" altLang="en-US"/>
+          </a:p>
+        </p:txBody>
+      </p:sp>
+      <p:sp>
+        <p:nvSpPr>
+          <p:cNvPr id="29" name="テキスト ボックス 28"/>
+          <p:cNvSpPr txBox="1"/>
+          <p:nvPr/>
+        </p:nvSpPr>
+        <p:spPr>
+          <a:xfrm>
+            <a:off x="2501748" y="4571836"/>
+            <a:ext cx="1836248" cy="369332"/>
+          </a:xfrm>
+          <a:prstGeom prst="rect">
+            <a:avLst/>
+          </a:prstGeom>
+          <a:noFill/>
+        </p:spPr>
+        <p:txBody>
+          <a:bodyPr wrap="square" rtlCol="0">
+            <a:spAutoFit/>
+          </a:bodyPr>
+          <a:lstStyle/>
+          <a:p>
+            <a:r>
+              <a:rPr kumimoji="1" lang="en-US" altLang="ja-JP" smtClean="0"/>
+              <a:t>(5) get messages</a:t>
+            </a:r>
+            <a:endParaRPr kumimoji="1" lang="ja-JP" altLang="en-US"/>
+          </a:p>
+        </p:txBody>
+      </p:sp>
+      <p:sp>
+        <p:nvSpPr>
+          <p:cNvPr id="13" name="下矢印 12"/>
+          <p:cNvSpPr/>
+          <p:nvPr/>
+        </p:nvSpPr>
+        <p:spPr>
+          <a:xfrm>
+            <a:off x="6270567" y="4149080"/>
+            <a:ext cx="419290" cy="576064"/>
+          </a:xfrm>
+          <a:prstGeom prst="downArrow">
+            <a:avLst/>
+          </a:prstGeom>
+        </p:spPr>
+        <p:style>
+          <a:lnRef idx="2">
+            <a:schemeClr val="accent1">
+              <a:shade val="50000"/>
+            </a:schemeClr>
+          </a:lnRef>
+          <a:fillRef idx="1">
+            <a:schemeClr val="accent1"/>
+          </a:fillRef>
+          <a:effectRef idx="0">
+            <a:schemeClr val="accent1"/>
+          </a:effectRef>
+          <a:fontRef idx="minor">
+            <a:schemeClr val="lt1"/>
+          </a:fontRef>
+        </p:style>
+        <p:txBody>
+          <a:bodyPr rtlCol="0" anchor="ctr"/>
+          <a:lstStyle/>
+          <a:p>
+            <a:pPr algn="ctr"/>
+            <a:endParaRPr kumimoji="1" lang="ja-JP" altLang="en-US"/>
+          </a:p>
+        </p:txBody>
+      </p:sp>
+      <p:sp>
+        <p:nvSpPr>
+          <p:cNvPr id="30" name="テキスト ボックス 29"/>
+          <p:cNvSpPr txBox="1"/>
+          <p:nvPr/>
+        </p:nvSpPr>
+        <p:spPr>
+          <a:xfrm>
+            <a:off x="6948264" y="4252446"/>
+            <a:ext cx="1944216" cy="369332"/>
+          </a:xfrm>
+          <a:prstGeom prst="rect">
+            <a:avLst/>
+          </a:prstGeom>
+          <a:noFill/>
+        </p:spPr>
+        <p:txBody>
+          <a:bodyPr wrap="square" rtlCol="0">
+            <a:spAutoFit/>
+          </a:bodyPr>
+          <a:lstStyle/>
+          <a:p>
+            <a:r>
+              <a:rPr kumimoji="1" lang="en-US" altLang="ja-JP" smtClean="0"/>
+              <a:t>(3’)</a:t>
+            </a:r>
+            <a:r>
+              <a:rPr lang="ja-JP" altLang="en-US"/>
+              <a:t> </a:t>
+            </a:r>
+            <a:r>
+              <a:rPr lang="en-US" altLang="ja-JP" smtClean="0"/>
+              <a:t>get RuleResult</a:t>
+            </a:r>
+            <a:endParaRPr kumimoji="1" lang="ja-JP" altLang="en-US"/>
+          </a:p>
+        </p:txBody>
+      </p:sp>
+      <p:sp>
+        <p:nvSpPr>
+          <p:cNvPr id="14" name="右矢印 13"/>
+          <p:cNvSpPr/>
+          <p:nvPr/>
+        </p:nvSpPr>
+        <p:spPr>
+          <a:xfrm rot="2044010">
+            <a:off x="2753944" y="3944477"/>
+            <a:ext cx="2841644" cy="432048"/>
+          </a:xfrm>
+          <a:prstGeom prst="rightArrow">
+            <a:avLst/>
+          </a:prstGeom>
+        </p:spPr>
+        <p:style>
+          <a:lnRef idx="2">
+            <a:schemeClr val="accent1">
+              <a:shade val="50000"/>
+            </a:schemeClr>
+          </a:lnRef>
+          <a:fillRef idx="1">
+            <a:schemeClr val="accent1"/>
+          </a:fillRef>
+          <a:effectRef idx="0">
+            <a:schemeClr val="accent1"/>
+          </a:effectRef>
+          <a:fontRef idx="minor">
+            <a:schemeClr val="lt1"/>
+          </a:fontRef>
+        </p:style>
+        <p:txBody>
+          <a:bodyPr rtlCol="0" anchor="ctr"/>
+          <a:lstStyle/>
+          <a:p>
+            <a:pPr algn="ctr"/>
+            <a:endParaRPr kumimoji="1" lang="ja-JP" altLang="en-US"/>
+          </a:p>
+        </p:txBody>
+      </p:sp>
+      <p:sp>
+        <p:nvSpPr>
+          <p:cNvPr id="31" name="テキスト ボックス 30"/>
+          <p:cNvSpPr txBox="1"/>
+          <p:nvPr/>
+        </p:nvSpPr>
+        <p:spPr>
+          <a:xfrm>
+            <a:off x="3419872" y="1619508"/>
+            <a:ext cx="1368152" cy="369332"/>
+          </a:xfrm>
+          <a:prstGeom prst="rect">
+            <a:avLst/>
+          </a:prstGeom>
+          <a:noFill/>
+        </p:spPr>
+        <p:txBody>
+          <a:bodyPr wrap="square" rtlCol="0">
+            <a:spAutoFit/>
+          </a:bodyPr>
+          <a:lstStyle/>
+          <a:p>
+            <a:r>
+              <a:rPr kumimoji="1" lang="en-US" altLang="ja-JP" smtClean="0"/>
+              <a:t>(3) validate</a:t>
+            </a:r>
+            <a:endParaRPr kumimoji="1" lang="ja-JP" altLang="en-US"/>
+          </a:p>
+        </p:txBody>
+      </p:sp>
+      <p:sp>
+        <p:nvSpPr>
+          <p:cNvPr id="32" name="テキスト ボックス 31"/>
+          <p:cNvSpPr txBox="1"/>
+          <p:nvPr/>
+        </p:nvSpPr>
+        <p:spPr>
+          <a:xfrm>
+            <a:off x="5562088" y="5373216"/>
+            <a:ext cx="1836248" cy="369332"/>
+          </a:xfrm>
+          <a:prstGeom prst="rect">
+            <a:avLst/>
+          </a:prstGeom>
+          <a:noFill/>
+        </p:spPr>
+        <p:txBody>
+          <a:bodyPr wrap="square" rtlCol="0">
+            <a:spAutoFit/>
+          </a:bodyPr>
+          <a:lstStyle/>
+          <a:p>
+            <a:r>
+              <a:rPr kumimoji="1" lang="en-US" altLang="ja-JP" smtClean="0"/>
+              <a:t>(4) confirm result</a:t>
             </a:r>
             <a:endParaRPr kumimoji="1" lang="ja-JP" altLang="en-US"/>
           </a:p>

</xml_diff>